<commit_message>
Update ppt pdf files
</commit_message>
<xml_diff>
--- a/RxSwiftBasics/day1/RxSwiftBasics1.pptx
+++ b/RxSwiftBasics/day1/RxSwiftBasics1.pptx
@@ -5,25 +5,26 @@
     <p:sldMasterId id="2147483657" r:id="rId1"/>
   </p:sldMasterIdLst>
   <p:notesMasterIdLst>
-    <p:notesMasterId r:id="rId18"/>
+    <p:notesMasterId r:id="rId19"/>
   </p:notesMasterIdLst>
   <p:sldIdLst>
     <p:sldId id="256" r:id="rId2"/>
     <p:sldId id="333" r:id="rId3"/>
-    <p:sldId id="288" r:id="rId4"/>
-    <p:sldId id="327" r:id="rId5"/>
-    <p:sldId id="328" r:id="rId6"/>
-    <p:sldId id="289" r:id="rId7"/>
-    <p:sldId id="290" r:id="rId8"/>
-    <p:sldId id="302" r:id="rId9"/>
-    <p:sldId id="291" r:id="rId10"/>
-    <p:sldId id="301" r:id="rId11"/>
-    <p:sldId id="292" r:id="rId12"/>
-    <p:sldId id="300" r:id="rId13"/>
-    <p:sldId id="329" r:id="rId14"/>
-    <p:sldId id="330" r:id="rId15"/>
-    <p:sldId id="332" r:id="rId16"/>
-    <p:sldId id="331" r:id="rId17"/>
+    <p:sldId id="334" r:id="rId4"/>
+    <p:sldId id="288" r:id="rId5"/>
+    <p:sldId id="327" r:id="rId6"/>
+    <p:sldId id="328" r:id="rId7"/>
+    <p:sldId id="289" r:id="rId8"/>
+    <p:sldId id="290" r:id="rId9"/>
+    <p:sldId id="302" r:id="rId10"/>
+    <p:sldId id="291" r:id="rId11"/>
+    <p:sldId id="301" r:id="rId12"/>
+    <p:sldId id="292" r:id="rId13"/>
+    <p:sldId id="300" r:id="rId14"/>
+    <p:sldId id="329" r:id="rId15"/>
+    <p:sldId id="330" r:id="rId16"/>
+    <p:sldId id="332" r:id="rId17"/>
+    <p:sldId id="331" r:id="rId18"/>
   </p:sldIdLst>
   <p:sldSz cx="9144000" cy="5143500" type="screen16x9"/>
   <p:notesSz cx="6858000" cy="9144000"/>
@@ -1220,6 +1221,107 @@
 </file>
 
 <file path=ppt/notesSlides/notesSlide16.xml><?xml version="1.0" encoding="utf-8"?>
+<p:notes xmlns:a="http://schemas.openxmlformats.org/drawingml/2006/main" xmlns:r="http://schemas.openxmlformats.org/officeDocument/2006/relationships" xmlns:p="http://schemas.openxmlformats.org/presentationml/2006/main" showMasterSp="0" showMasterPhAnim="0">
+  <p:cSld>
+    <p:spTree>
+      <p:nvGrpSpPr>
+        <p:cNvPr id="1" name="Shape 185"/>
+        <p:cNvGrpSpPr/>
+        <p:nvPr/>
+      </p:nvGrpSpPr>
+      <p:grpSpPr>
+        <a:xfrm>
+          <a:off x="0" y="0"/>
+          <a:ext cx="0" cy="0"/>
+          <a:chOff x="0" y="0"/>
+          <a:chExt cx="0" cy="0"/>
+        </a:xfrm>
+      </p:grpSpPr>
+      <p:sp>
+        <p:nvSpPr>
+          <p:cNvPr id="186" name="Shape 186"/>
+          <p:cNvSpPr>
+            <a:spLocks noGrp="1" noRot="1" noChangeAspect="1"/>
+          </p:cNvSpPr>
+          <p:nvPr>
+            <p:ph type="sldImg" idx="2"/>
+          </p:nvPr>
+        </p:nvSpPr>
+        <p:spPr>
+          <a:xfrm>
+            <a:off x="381000" y="685800"/>
+            <a:ext cx="6096000" cy="3429000"/>
+          </a:xfrm>
+          <a:custGeom>
+            <a:avLst/>
+            <a:gdLst/>
+            <a:ahLst/>
+            <a:cxnLst/>
+            <a:rect l="0" t="0" r="0" b="0"/>
+            <a:pathLst>
+              <a:path w="120000" h="120000" extrusionOk="0">
+                <a:moveTo>
+                  <a:pt x="0" y="0"/>
+                </a:moveTo>
+                <a:lnTo>
+                  <a:pt x="120000" y="0"/>
+                </a:lnTo>
+                <a:lnTo>
+                  <a:pt x="120000" y="120000"/>
+                </a:lnTo>
+                <a:lnTo>
+                  <a:pt x="0" y="120000"/>
+                </a:lnTo>
+                <a:close/>
+              </a:path>
+            </a:pathLst>
+          </a:custGeom>
+        </p:spPr>
+      </p:sp>
+      <p:sp>
+        <p:nvSpPr>
+          <p:cNvPr id="187" name="Shape 187"/>
+          <p:cNvSpPr txBox="1">
+            <a:spLocks noGrp="1"/>
+          </p:cNvSpPr>
+          <p:nvPr>
+            <p:ph type="body" idx="1"/>
+          </p:nvPr>
+        </p:nvSpPr>
+        <p:spPr>
+          <a:xfrm>
+            <a:off x="685800" y="4343400"/>
+            <a:ext cx="5486400" cy="4114800"/>
+          </a:xfrm>
+          <a:prstGeom prst="rect">
+            <a:avLst/>
+          </a:prstGeom>
+        </p:spPr>
+        <p:txBody>
+          <a:bodyPr wrap="square" lIns="91425" tIns="91425" rIns="91425" bIns="91425" anchor="t" anchorCtr="0">
+            <a:noAutofit/>
+          </a:bodyPr>
+          <a:lstStyle/>
+          <a:p>
+            <a:pPr lvl="0">
+              <a:spcBef>
+                <a:spcPts val="0"/>
+              </a:spcBef>
+              <a:buNone/>
+            </a:pPr>
+            <a:endParaRPr/>
+          </a:p>
+        </p:txBody>
+      </p:sp>
+    </p:spTree>
+  </p:cSld>
+  <p:clrMapOvr>
+    <a:masterClrMapping/>
+  </p:clrMapOvr>
+</p:notes>
+</file>
+
+<file path=ppt/notesSlides/notesSlide17.xml><?xml version="1.0" encoding="utf-8"?>
 <p:notes xmlns:a="http://schemas.openxmlformats.org/drawingml/2006/main" xmlns:r="http://schemas.openxmlformats.org/officeDocument/2006/relationships" xmlns:p="http://schemas.openxmlformats.org/presentationml/2006/main" showMasterSp="0" showMasterPhAnim="0">
   <p:cSld>
     <p:spTree>
@@ -4845,28 +4947,8 @@
               <a:buNone/>
             </a:pPr>
             <a:r>
-              <a:rPr lang="en-US" dirty="0"/>
-              <a:t>m</a:t>
-            </a:r>
-            <a:r>
               <a:rPr lang="en-US" dirty="0" smtClean="0"/>
-              <a:t>ap </a:t>
-            </a:r>
-            <a:r>
-              <a:rPr lang="en-US" dirty="0" err="1" smtClean="0"/>
-              <a:t>vs</a:t>
-            </a:r>
-            <a:r>
-              <a:rPr lang="en-US" dirty="0" smtClean="0"/>
-              <a:t> </a:t>
-            </a:r>
-            <a:r>
-              <a:rPr lang="en-US" dirty="0" err="1" smtClean="0"/>
-              <a:t>flatMap</a:t>
-            </a:r>
-            <a:r>
-              <a:rPr lang="en-US" dirty="0" smtClean="0"/>
-              <a:t> - 1</a:t>
+              <a:t>Observable Sample - 3</a:t>
             </a:r>
             <a:endParaRPr lang="en" dirty="0"/>
           </a:p>
@@ -4943,7 +5025,7 @@
       </p:pic>
       <p:pic>
         <p:nvPicPr>
-          <p:cNvPr id="4" name="Picture 3" descr="Screen Shot 2018-04-17 at 8.49.37 PM.png"/>
+          <p:cNvPr id="4" name="Picture 3" descr="Screen Shot 2018-04-16 at 7.46.51 PM.png"/>
           <p:cNvPicPr>
             <a:picLocks noChangeAspect="1"/>
           </p:cNvPicPr>
@@ -4963,8 +5045,8 @@
         </p:blipFill>
         <p:spPr>
           <a:xfrm>
-            <a:off x="1557122" y="1733550"/>
-            <a:ext cx="3187700" cy="2628900"/>
+            <a:off x="1190883" y="1585612"/>
+            <a:ext cx="4483100" cy="3213100"/>
           </a:xfrm>
           <a:prstGeom prst="rect">
             <a:avLst/>
@@ -4974,7 +5056,7 @@
     </p:spTree>
     <p:extLst>
       <p:ext uri="{BB962C8B-B14F-4D97-AF65-F5344CB8AC3E}">
-        <p14:creationId xmlns:p14="http://schemas.microsoft.com/office/powerpoint/2010/main" val="2730398878"/>
+        <p14:creationId xmlns:p14="http://schemas.microsoft.com/office/powerpoint/2010/main" val="3848107491"/>
       </p:ext>
     </p:extLst>
   </p:cSld>
@@ -5061,7 +5143,7 @@
             </a:r>
             <a:r>
               <a:rPr lang="en-US" dirty="0" smtClean="0"/>
-              <a:t> - 2</a:t>
+              <a:t> - 1</a:t>
             </a:r>
             <a:endParaRPr lang="en" dirty="0"/>
           </a:p>
@@ -5138,7 +5220,7 @@
       </p:pic>
       <p:pic>
         <p:nvPicPr>
-          <p:cNvPr id="4" name="Picture 3" descr="Screen Shot 2018-04-17 at 8.47.41 PM.png"/>
+          <p:cNvPr id="4" name="Picture 3" descr="Screen Shot 2018-04-17 at 8.49.37 PM.png"/>
           <p:cNvPicPr>
             <a:picLocks noChangeAspect="1"/>
           </p:cNvPicPr>
@@ -5158,8 +5240,8 @@
         </p:blipFill>
         <p:spPr>
           <a:xfrm>
-            <a:off x="1398030" y="1548027"/>
-            <a:ext cx="3835400" cy="2794000"/>
+            <a:off x="1557122" y="1733550"/>
+            <a:ext cx="3187700" cy="2628900"/>
           </a:xfrm>
           <a:prstGeom prst="rect">
             <a:avLst/>
@@ -5169,7 +5251,7 @@
     </p:spTree>
     <p:extLst>
       <p:ext uri="{BB962C8B-B14F-4D97-AF65-F5344CB8AC3E}">
-        <p14:creationId xmlns:p14="http://schemas.microsoft.com/office/powerpoint/2010/main" val="3437344151"/>
+        <p14:creationId xmlns:p14="http://schemas.microsoft.com/office/powerpoint/2010/main" val="2730398878"/>
       </p:ext>
     </p:extLst>
   </p:cSld>
@@ -5256,7 +5338,7 @@
             </a:r>
             <a:r>
               <a:rPr lang="en-US" dirty="0" smtClean="0"/>
-              <a:t> - 3</a:t>
+              <a:t> - 2</a:t>
             </a:r>
             <a:endParaRPr lang="en" dirty="0"/>
           </a:p>
@@ -5333,7 +5415,7 @@
       </p:pic>
       <p:pic>
         <p:nvPicPr>
-          <p:cNvPr id="3" name="Picture 2" descr="Screen Shot 2018-04-16 at 7.54.50 PM.png"/>
+          <p:cNvPr id="4" name="Picture 3" descr="Screen Shot 2018-04-17 at 8.47.41 PM.png"/>
           <p:cNvPicPr>
             <a:picLocks noChangeAspect="1"/>
           </p:cNvPicPr>
@@ -5353,8 +5435,8 @@
         </p:blipFill>
         <p:spPr>
           <a:xfrm>
-            <a:off x="1291109" y="1469080"/>
-            <a:ext cx="4975859" cy="3407505"/>
+            <a:off x="1398030" y="1548027"/>
+            <a:ext cx="3835400" cy="2794000"/>
           </a:xfrm>
           <a:prstGeom prst="rect">
             <a:avLst/>
@@ -5364,7 +5446,7 @@
     </p:spTree>
     <p:extLst>
       <p:ext uri="{BB962C8B-B14F-4D97-AF65-F5344CB8AC3E}">
-        <p14:creationId xmlns:p14="http://schemas.microsoft.com/office/powerpoint/2010/main" val="1121167009"/>
+        <p14:creationId xmlns:p14="http://schemas.microsoft.com/office/powerpoint/2010/main" val="3437344151"/>
       </p:ext>
     </p:extLst>
   </p:cSld>
@@ -5430,8 +5512,28 @@
               <a:buNone/>
             </a:pPr>
             <a:r>
+              <a:rPr lang="en-US" dirty="0"/>
+              <a:t>m</a:t>
+            </a:r>
+            <a:r>
               <a:rPr lang="en-US" dirty="0" smtClean="0"/>
-              <a:t>Lab - 1</a:t>
+              <a:t>ap </a:t>
+            </a:r>
+            <a:r>
+              <a:rPr lang="en-US" dirty="0" err="1" smtClean="0"/>
+              <a:t>vs</a:t>
+            </a:r>
+            <a:r>
+              <a:rPr lang="en-US" dirty="0" smtClean="0"/>
+              <a:t> </a:t>
+            </a:r>
+            <a:r>
+              <a:rPr lang="en-US" dirty="0" err="1" smtClean="0"/>
+              <a:t>flatMap</a:t>
+            </a:r>
+            <a:r>
+              <a:rPr lang="en-US" dirty="0" smtClean="0"/>
+              <a:t> - 3</a:t>
             </a:r>
             <a:endParaRPr lang="en" dirty="0"/>
           </a:p>
@@ -5506,120 +5608,40 @@
           </a:prstGeom>
         </p:spPr>
       </p:pic>
-      <p:sp>
-        <p:nvSpPr>
-          <p:cNvPr id="4" name="TextBox 3"/>
-          <p:cNvSpPr txBox="1"/>
+      <p:pic>
+        <p:nvPicPr>
+          <p:cNvPr id="3" name="Picture 2" descr="Screen Shot 2018-04-16 at 7.54.50 PM.png"/>
+          <p:cNvPicPr>
+            <a:picLocks noChangeAspect="1"/>
+          </p:cNvPicPr>
           <p:nvPr/>
-        </p:nvSpPr>
-        <p:spPr>
-          <a:xfrm>
-            <a:off x="1062182" y="1691409"/>
-            <a:ext cx="4115968" cy="2462213"/>
-          </a:xfrm>
-          <a:prstGeom prst="rect">
-            <a:avLst/>
-          </a:prstGeom>
-          <a:noFill/>
-        </p:spPr>
-        <p:txBody>
-          <a:bodyPr wrap="none" rtlCol="0">
-            <a:spAutoFit/>
-          </a:bodyPr>
-          <a:lstStyle/>
-          <a:p>
-            <a:r>
-              <a:rPr lang="en-US" dirty="0" smtClean="0"/>
-              <a:t>Create Observables</a:t>
-            </a:r>
-          </a:p>
-          <a:p>
-            <a:endParaRPr lang="en-US" dirty="0"/>
-          </a:p>
-          <a:p>
-            <a:r>
-              <a:rPr lang="en-US" dirty="0" smtClean="0"/>
-              <a:t>Pikachu, Ash, Misty, Brock, </a:t>
-            </a:r>
-            <a:r>
-              <a:rPr lang="en-US" dirty="0" err="1" smtClean="0"/>
-              <a:t>Charmander</a:t>
-            </a:r>
-            <a:r>
-              <a:rPr lang="en-US" dirty="0" smtClean="0"/>
-              <a:t>, </a:t>
-            </a:r>
-            <a:r>
-              <a:rPr lang="en-US" dirty="0" err="1" smtClean="0"/>
-              <a:t>Squirtle</a:t>
-            </a:r>
-            <a:endParaRPr lang="en-US" dirty="0" smtClean="0"/>
-          </a:p>
-          <a:p>
-            <a:endParaRPr lang="en-US" dirty="0"/>
-          </a:p>
-          <a:p>
-            <a:r>
-              <a:rPr lang="en-US" dirty="0" smtClean="0"/>
-              <a:t> </a:t>
-            </a:r>
-          </a:p>
-          <a:p>
-            <a:pPr marL="342900" indent="-342900">
-              <a:buAutoNum type="arabicPeriod"/>
-            </a:pPr>
-            <a:r>
-              <a:rPr lang="en-US" dirty="0" smtClean="0"/>
-              <a:t>of</a:t>
-            </a:r>
-          </a:p>
-          <a:p>
-            <a:pPr marL="342900" indent="-342900">
-              <a:buAutoNum type="arabicPeriod"/>
-            </a:pPr>
-            <a:endParaRPr lang="en-US" dirty="0" smtClean="0"/>
-          </a:p>
-          <a:p>
-            <a:pPr marL="342900" indent="-342900">
-              <a:buAutoNum type="arabicPeriod"/>
-            </a:pPr>
-            <a:r>
-              <a:rPr lang="en-US" dirty="0"/>
-              <a:t>f</a:t>
-            </a:r>
-            <a:r>
-              <a:rPr lang="en-US" dirty="0" smtClean="0"/>
-              <a:t>rom</a:t>
-            </a:r>
-          </a:p>
-          <a:p>
-            <a:pPr marL="342900" indent="-342900">
-              <a:buAutoNum type="arabicPeriod"/>
-            </a:pPr>
-            <a:endParaRPr lang="en-US" dirty="0" smtClean="0"/>
-          </a:p>
-          <a:p>
-            <a:pPr marL="342900" indent="-342900">
-              <a:buAutoNum type="arabicPeriod"/>
-            </a:pPr>
-            <a:r>
-              <a:rPr lang="en-US" dirty="0"/>
-              <a:t>c</a:t>
-            </a:r>
-            <a:r>
-              <a:rPr lang="en-US" dirty="0" smtClean="0"/>
-              <a:t>reate</a:t>
-            </a:r>
-          </a:p>
-          <a:p>
-            <a:endParaRPr lang="en-US" dirty="0"/>
-          </a:p>
-        </p:txBody>
-      </p:sp>
+        </p:nvPicPr>
+        <p:blipFill>
+          <a:blip r:embed="rId4">
+            <a:extLst>
+              <a:ext uri="{28A0092B-C50C-407E-A947-70E740481C1C}">
+                <a14:useLocalDpi xmlns:a14="http://schemas.microsoft.com/office/drawing/2010/main" val="0"/>
+              </a:ext>
+            </a:extLst>
+          </a:blip>
+          <a:stretch>
+            <a:fillRect/>
+          </a:stretch>
+        </p:blipFill>
+        <p:spPr>
+          <a:xfrm>
+            <a:off x="1291109" y="1469080"/>
+            <a:ext cx="4975859" cy="3407505"/>
+          </a:xfrm>
+          <a:prstGeom prst="rect">
+            <a:avLst/>
+          </a:prstGeom>
+        </p:spPr>
+      </p:pic>
     </p:spTree>
     <p:extLst>
       <p:ext uri="{BB962C8B-B14F-4D97-AF65-F5344CB8AC3E}">
-        <p14:creationId xmlns:p14="http://schemas.microsoft.com/office/powerpoint/2010/main" val="3484410807"/>
+        <p14:creationId xmlns:p14="http://schemas.microsoft.com/office/powerpoint/2010/main" val="1121167009"/>
       </p:ext>
     </p:extLst>
   </p:cSld>
@@ -5686,7 +5708,7 @@
             </a:pPr>
             <a:r>
               <a:rPr lang="en-US" dirty="0" smtClean="0"/>
-              <a:t>Lab - 2</a:t>
+              <a:t>Lab - 1</a:t>
             </a:r>
             <a:endParaRPr lang="en" dirty="0"/>
           </a:p>
@@ -5769,8 +5791,8 @@
         </p:nvSpPr>
         <p:spPr>
           <a:xfrm>
-            <a:off x="1044862" y="1795318"/>
-            <a:ext cx="4260273" cy="2462213"/>
+            <a:off x="1062182" y="1691409"/>
+            <a:ext cx="4115968" cy="2462213"/>
           </a:xfrm>
           <a:prstGeom prst="rect">
             <a:avLst/>
@@ -5778,14 +5800,54 @@
           <a:noFill/>
         </p:spPr>
         <p:txBody>
-          <a:bodyPr wrap="square" rtlCol="0">
+          <a:bodyPr wrap="none" rtlCol="0">
             <a:spAutoFit/>
           </a:bodyPr>
           <a:lstStyle/>
           <a:p>
             <a:r>
               <a:rPr lang="en-US" dirty="0" smtClean="0"/>
-              <a:t>filter</a:t>
+              <a:t>Create Observables</a:t>
+            </a:r>
+          </a:p>
+          <a:p>
+            <a:endParaRPr lang="en-US" dirty="0"/>
+          </a:p>
+          <a:p>
+            <a:r>
+              <a:rPr lang="en-US" dirty="0" smtClean="0"/>
+              <a:t>Pikachu, Ash, Misty, Brock, </a:t>
+            </a:r>
+            <a:r>
+              <a:rPr lang="en-US" dirty="0" err="1" smtClean="0"/>
+              <a:t>Charmander</a:t>
+            </a:r>
+            <a:r>
+              <a:rPr lang="en-US" dirty="0" smtClean="0"/>
+              <a:t>, </a:t>
+            </a:r>
+            <a:r>
+              <a:rPr lang="en-US" dirty="0" err="1" smtClean="0"/>
+              <a:t>Squirtle</a:t>
+            </a:r>
+            <a:endParaRPr lang="en-US" dirty="0" smtClean="0"/>
+          </a:p>
+          <a:p>
+            <a:endParaRPr lang="en-US" dirty="0"/>
+          </a:p>
+          <a:p>
+            <a:r>
+              <a:rPr lang="en-US" dirty="0" smtClean="0"/>
+              <a:t> </a:t>
+            </a:r>
+          </a:p>
+          <a:p>
+            <a:pPr marL="342900" indent="-342900">
+              <a:buAutoNum type="arabicPeriod"/>
+            </a:pPr>
+            <a:r>
+              <a:rPr lang="en-US" dirty="0" smtClean="0"/>
+              <a:t>of</a:t>
             </a:r>
           </a:p>
           <a:p>
@@ -5795,16 +5857,17 @@
             <a:endParaRPr lang="en-US" dirty="0" smtClean="0"/>
           </a:p>
           <a:p>
-            <a:r>
-              <a:rPr lang="en-US" dirty="0" smtClean="0"/>
-              <a:t>1,2,3,4,5  =&gt; less than 3</a:t>
-            </a:r>
-          </a:p>
-          <a:p>
             <a:pPr marL="342900" indent="-342900">
               <a:buAutoNum type="arabicPeriod"/>
             </a:pPr>
-            <a:endParaRPr lang="en-US" dirty="0"/>
+            <a:r>
+              <a:rPr lang="en-US" dirty="0"/>
+              <a:t>f</a:t>
+            </a:r>
+            <a:r>
+              <a:rPr lang="en-US" dirty="0" smtClean="0"/>
+              <a:t>rom</a:t>
+            </a:r>
           </a:p>
           <a:p>
             <a:pPr marL="342900" indent="-342900">
@@ -5813,30 +5876,19 @@
             <a:endParaRPr lang="en-US" dirty="0" smtClean="0"/>
           </a:p>
           <a:p>
-            <a:r>
-              <a:rPr lang="en-US" dirty="0" smtClean="0"/>
-              <a:t>map</a:t>
-            </a:r>
-          </a:p>
-          <a:p>
-            <a:endParaRPr lang="en-US" dirty="0" smtClean="0"/>
-          </a:p>
-          <a:p>
-            <a:r>
-              <a:rPr lang="en-US" dirty="0" smtClean="0"/>
-              <a:t>1,2,3,4,5 =&gt; 10,20,30,40,50</a:t>
-            </a:r>
-          </a:p>
-          <a:p>
-            <a:endParaRPr lang="en-US" dirty="0"/>
-          </a:p>
-          <a:p>
-            <a:endParaRPr lang="en-US" dirty="0"/>
-          </a:p>
-          <a:p>
             <a:pPr marL="342900" indent="-342900">
               <a:buAutoNum type="arabicPeriod"/>
             </a:pPr>
+            <a:r>
+              <a:rPr lang="en-US" dirty="0"/>
+              <a:t>c</a:t>
+            </a:r>
+            <a:r>
+              <a:rPr lang="en-US" dirty="0" smtClean="0"/>
+              <a:t>reate</a:t>
+            </a:r>
+          </a:p>
+          <a:p>
             <a:endParaRPr lang="en-US" dirty="0"/>
           </a:p>
         </p:txBody>
@@ -5911,7 +5963,7 @@
             </a:pPr>
             <a:r>
               <a:rPr lang="en-US" dirty="0" smtClean="0"/>
-              <a:t>Lab - 3</a:t>
+              <a:t>Lab - 2</a:t>
             </a:r>
             <a:endParaRPr lang="en" dirty="0"/>
           </a:p>
@@ -5994,8 +6046,8 @@
         </p:nvSpPr>
         <p:spPr>
           <a:xfrm>
-            <a:off x="877453" y="1506681"/>
-            <a:ext cx="5790047" cy="738664"/>
+            <a:off x="1044862" y="1795318"/>
+            <a:ext cx="4260273" cy="2462213"/>
           </a:xfrm>
           <a:prstGeom prst="rect">
             <a:avLst/>
@@ -6009,105 +6061,67 @@
           <a:lstStyle/>
           <a:p>
             <a:r>
-              <a:rPr lang="en-US" dirty="0"/>
-              <a:t>m</a:t>
-            </a:r>
-            <a:r>
               <a:rPr lang="en-US" dirty="0" smtClean="0"/>
-              <a:t>erge, </a:t>
-            </a:r>
-            <a:r>
-              <a:rPr lang="en-US" dirty="0" err="1" smtClean="0"/>
-              <a:t>concat</a:t>
-            </a:r>
+              <a:t>filter</a:t>
+            </a:r>
+          </a:p>
+          <a:p>
+            <a:pPr marL="342900" indent="-342900">
+              <a:buAutoNum type="arabicPeriod"/>
+            </a:pPr>
+            <a:endParaRPr lang="en-US" dirty="0" smtClean="0"/>
+          </a:p>
+          <a:p>
             <a:r>
               <a:rPr lang="en-US" dirty="0" smtClean="0"/>
-              <a:t> </a:t>
-            </a:r>
-          </a:p>
-          <a:p>
+              <a:t>1,2,3,4,5  =&gt; less than 3</a:t>
+            </a:r>
+          </a:p>
+          <a:p>
+            <a:pPr marL="342900" indent="-342900">
+              <a:buAutoNum type="arabicPeriod"/>
+            </a:pPr>
+            <a:endParaRPr lang="en-US" dirty="0"/>
+          </a:p>
+          <a:p>
+            <a:pPr marL="342900" indent="-342900">
+              <a:buAutoNum type="arabicPeriod"/>
+            </a:pPr>
             <a:endParaRPr lang="en-US" dirty="0" smtClean="0"/>
           </a:p>
           <a:p>
             <a:r>
               <a:rPr lang="en-US" dirty="0" smtClean="0"/>
-              <a:t>Create two observables and use merge and </a:t>
-            </a:r>
-            <a:r>
-              <a:rPr lang="en-US" dirty="0" err="1" smtClean="0"/>
-              <a:t>concat</a:t>
-            </a:r>
+              <a:t>map</a:t>
+            </a:r>
+          </a:p>
+          <a:p>
+            <a:endParaRPr lang="en-US" dirty="0" smtClean="0"/>
+          </a:p>
+          <a:p>
             <a:r>
               <a:rPr lang="en-US" dirty="0" smtClean="0"/>
-              <a:t> operator </a:t>
-            </a:r>
+              <a:t>1,2,3,4,5 =&gt; 10,20,30,40,50</a:t>
+            </a:r>
+          </a:p>
+          <a:p>
+            <a:endParaRPr lang="en-US" dirty="0"/>
+          </a:p>
+          <a:p>
+            <a:endParaRPr lang="en-US" dirty="0"/>
+          </a:p>
+          <a:p>
+            <a:pPr marL="342900" indent="-342900">
+              <a:buAutoNum type="arabicPeriod"/>
+            </a:pPr>
+            <a:endParaRPr lang="en-US" dirty="0"/>
           </a:p>
         </p:txBody>
       </p:sp>
-      <p:pic>
-        <p:nvPicPr>
-          <p:cNvPr id="3" name="Picture 2" descr="Screen Shot 2018-05-19 at 9.49.11 PM.png"/>
-          <p:cNvPicPr>
-            <a:picLocks noChangeAspect="1"/>
-          </p:cNvPicPr>
-          <p:nvPr/>
-        </p:nvPicPr>
-        <p:blipFill>
-          <a:blip r:embed="rId4">
-            <a:extLst>
-              <a:ext uri="{28A0092B-C50C-407E-A947-70E740481C1C}">
-                <a14:useLocalDpi xmlns:a14="http://schemas.microsoft.com/office/drawing/2010/main" val="0"/>
-              </a:ext>
-            </a:extLst>
-          </a:blip>
-          <a:stretch>
-            <a:fillRect/>
-          </a:stretch>
-        </p:blipFill>
-        <p:spPr>
-          <a:xfrm>
-            <a:off x="1230116" y="2701314"/>
-            <a:ext cx="4483100" cy="571500"/>
-          </a:xfrm>
-          <a:prstGeom prst="rect">
-            <a:avLst/>
-          </a:prstGeom>
-        </p:spPr>
-      </p:pic>
-      <p:pic>
-        <p:nvPicPr>
-          <p:cNvPr id="5" name="Picture 4" descr="Screen Shot 2018-05-19 at 9.49.21 PM.png"/>
-          <p:cNvPicPr>
-            <a:picLocks noChangeAspect="1"/>
-          </p:cNvPicPr>
-          <p:nvPr/>
-        </p:nvPicPr>
-        <p:blipFill>
-          <a:blip r:embed="rId5">
-            <a:extLst>
-              <a:ext uri="{28A0092B-C50C-407E-A947-70E740481C1C}">
-                <a14:useLocalDpi xmlns:a14="http://schemas.microsoft.com/office/drawing/2010/main" val="0"/>
-              </a:ext>
-            </a:extLst>
-          </a:blip>
-          <a:stretch>
-            <a:fillRect/>
-          </a:stretch>
-        </p:blipFill>
-        <p:spPr>
-          <a:xfrm>
-            <a:off x="1230116" y="3686766"/>
-            <a:ext cx="4864100" cy="533400"/>
-          </a:xfrm>
-          <a:prstGeom prst="rect">
-            <a:avLst/>
-          </a:prstGeom>
-        </p:spPr>
-      </p:pic>
     </p:spTree>
     <p:extLst>
       <p:ext uri="{BB962C8B-B14F-4D97-AF65-F5344CB8AC3E}">
-        <p14:creationId xmlns:p14="http://schemas.microsoft.com/office/powerpoint/2010/main" val="1680466868"/>
+        <p14:creationId xmlns:p14="http://schemas.microsoft.com/office/powerpoint/2010/main" val="3484410807"/>
       </p:ext>
     </p:extLst>
   </p:cSld>
@@ -6174,7 +6188,7 @@
             </a:pPr>
             <a:r>
               <a:rPr lang="en-US" dirty="0" smtClean="0"/>
-              <a:t>Lab - 4</a:t>
+              <a:t>Lab - 3</a:t>
             </a:r>
             <a:endParaRPr lang="en" dirty="0"/>
           </a:p>
@@ -6214,6 +6228,269 @@
             <a:fld id="{00000000-1234-1234-1234-123412341234}" type="slidenum">
               <a:rPr lang="en"/>
               <a:t>16</a:t>
+            </a:fld>
+            <a:endParaRPr lang="en"/>
+          </a:p>
+        </p:txBody>
+      </p:sp>
+      <p:pic>
+        <p:nvPicPr>
+          <p:cNvPr id="2" name="Picture 1" descr="Rx_Logo_M.png"/>
+          <p:cNvPicPr>
+            <a:picLocks noChangeAspect="1"/>
+          </p:cNvPicPr>
+          <p:nvPr/>
+        </p:nvPicPr>
+        <p:blipFill>
+          <a:blip r:embed="rId3">
+            <a:extLst>
+              <a:ext uri="{28A0092B-C50C-407E-A947-70E740481C1C}">
+                <a14:useLocalDpi xmlns:a14="http://schemas.microsoft.com/office/drawing/2010/main" val="0"/>
+              </a:ext>
+            </a:extLst>
+          </a:blip>
+          <a:stretch>
+            <a:fillRect/>
+          </a:stretch>
+        </p:blipFill>
+        <p:spPr>
+          <a:xfrm>
+            <a:off x="151129" y="442005"/>
+            <a:ext cx="663146" cy="663146"/>
+          </a:xfrm>
+          <a:prstGeom prst="rect">
+            <a:avLst/>
+          </a:prstGeom>
+        </p:spPr>
+      </p:pic>
+      <p:sp>
+        <p:nvSpPr>
+          <p:cNvPr id="4" name="TextBox 3"/>
+          <p:cNvSpPr txBox="1"/>
+          <p:nvPr/>
+        </p:nvSpPr>
+        <p:spPr>
+          <a:xfrm>
+            <a:off x="877453" y="1506681"/>
+            <a:ext cx="5790047" cy="738664"/>
+          </a:xfrm>
+          <a:prstGeom prst="rect">
+            <a:avLst/>
+          </a:prstGeom>
+          <a:noFill/>
+        </p:spPr>
+        <p:txBody>
+          <a:bodyPr wrap="square" rtlCol="0">
+            <a:spAutoFit/>
+          </a:bodyPr>
+          <a:lstStyle/>
+          <a:p>
+            <a:r>
+              <a:rPr lang="en-US" dirty="0"/>
+              <a:t>m</a:t>
+            </a:r>
+            <a:r>
+              <a:rPr lang="en-US" dirty="0" smtClean="0"/>
+              <a:t>erge, </a:t>
+            </a:r>
+            <a:r>
+              <a:rPr lang="en-US" dirty="0" err="1" smtClean="0"/>
+              <a:t>concat</a:t>
+            </a:r>
+            <a:r>
+              <a:rPr lang="en-US" dirty="0" smtClean="0"/>
+              <a:t> </a:t>
+            </a:r>
+          </a:p>
+          <a:p>
+            <a:endParaRPr lang="en-US" dirty="0" smtClean="0"/>
+          </a:p>
+          <a:p>
+            <a:r>
+              <a:rPr lang="en-US" dirty="0" smtClean="0"/>
+              <a:t>Create two observables and use merge and </a:t>
+            </a:r>
+            <a:r>
+              <a:rPr lang="en-US" dirty="0" err="1" smtClean="0"/>
+              <a:t>concat</a:t>
+            </a:r>
+            <a:r>
+              <a:rPr lang="en-US" dirty="0" smtClean="0"/>
+              <a:t> operator </a:t>
+            </a:r>
+          </a:p>
+        </p:txBody>
+      </p:sp>
+      <p:pic>
+        <p:nvPicPr>
+          <p:cNvPr id="3" name="Picture 2" descr="Screen Shot 2018-05-19 at 9.49.11 PM.png"/>
+          <p:cNvPicPr>
+            <a:picLocks noChangeAspect="1"/>
+          </p:cNvPicPr>
+          <p:nvPr/>
+        </p:nvPicPr>
+        <p:blipFill>
+          <a:blip r:embed="rId4">
+            <a:extLst>
+              <a:ext uri="{28A0092B-C50C-407E-A947-70E740481C1C}">
+                <a14:useLocalDpi xmlns:a14="http://schemas.microsoft.com/office/drawing/2010/main" val="0"/>
+              </a:ext>
+            </a:extLst>
+          </a:blip>
+          <a:stretch>
+            <a:fillRect/>
+          </a:stretch>
+        </p:blipFill>
+        <p:spPr>
+          <a:xfrm>
+            <a:off x="1230116" y="2701314"/>
+            <a:ext cx="4483100" cy="571500"/>
+          </a:xfrm>
+          <a:prstGeom prst="rect">
+            <a:avLst/>
+          </a:prstGeom>
+        </p:spPr>
+      </p:pic>
+      <p:pic>
+        <p:nvPicPr>
+          <p:cNvPr id="5" name="Picture 4" descr="Screen Shot 2018-05-19 at 9.49.21 PM.png"/>
+          <p:cNvPicPr>
+            <a:picLocks noChangeAspect="1"/>
+          </p:cNvPicPr>
+          <p:nvPr/>
+        </p:nvPicPr>
+        <p:blipFill>
+          <a:blip r:embed="rId5">
+            <a:extLst>
+              <a:ext uri="{28A0092B-C50C-407E-A947-70E740481C1C}">
+                <a14:useLocalDpi xmlns:a14="http://schemas.microsoft.com/office/drawing/2010/main" val="0"/>
+              </a:ext>
+            </a:extLst>
+          </a:blip>
+          <a:stretch>
+            <a:fillRect/>
+          </a:stretch>
+        </p:blipFill>
+        <p:spPr>
+          <a:xfrm>
+            <a:off x="1230116" y="3686766"/>
+            <a:ext cx="4864100" cy="533400"/>
+          </a:xfrm>
+          <a:prstGeom prst="rect">
+            <a:avLst/>
+          </a:prstGeom>
+        </p:spPr>
+      </p:pic>
+    </p:spTree>
+    <p:extLst>
+      <p:ext uri="{BB962C8B-B14F-4D97-AF65-F5344CB8AC3E}">
+        <p14:creationId xmlns:p14="http://schemas.microsoft.com/office/powerpoint/2010/main" val="1680466868"/>
+      </p:ext>
+    </p:extLst>
+  </p:cSld>
+  <p:clrMapOvr>
+    <a:masterClrMapping/>
+  </p:clrMapOvr>
+  <p:timing>
+    <p:tnLst>
+      <p:par>
+        <p:cTn xmlns:p14="http://schemas.microsoft.com/office/powerpoint/2010/main" id="1" dur="indefinite" restart="never" nodeType="tmRoot"/>
+      </p:par>
+    </p:tnLst>
+  </p:timing>
+</p:sld>
+</file>
+
+<file path=ppt/slides/slide17.xml><?xml version="1.0" encoding="utf-8"?>
+<p:sld xmlns:a="http://schemas.openxmlformats.org/drawingml/2006/main" xmlns:r="http://schemas.openxmlformats.org/officeDocument/2006/relationships" xmlns:p="http://schemas.openxmlformats.org/presentationml/2006/main">
+  <p:cSld>
+    <p:spTree>
+      <p:nvGrpSpPr>
+        <p:cNvPr id="1" name="Shape 188"/>
+        <p:cNvGrpSpPr/>
+        <p:nvPr/>
+      </p:nvGrpSpPr>
+      <p:grpSpPr>
+        <a:xfrm>
+          <a:off x="0" y="0"/>
+          <a:ext cx="0" cy="0"/>
+          <a:chOff x="0" y="0"/>
+          <a:chExt cx="0" cy="0"/>
+        </a:xfrm>
+      </p:grpSpPr>
+      <p:sp>
+        <p:nvSpPr>
+          <p:cNvPr id="189" name="Shape 189"/>
+          <p:cNvSpPr txBox="1">
+            <a:spLocks noGrp="1"/>
+          </p:cNvSpPr>
+          <p:nvPr>
+            <p:ph type="title"/>
+          </p:nvPr>
+        </p:nvSpPr>
+        <p:spPr>
+          <a:xfrm>
+            <a:off x="814275" y="392575"/>
+            <a:ext cx="5258400" cy="766200"/>
+          </a:xfrm>
+          <a:prstGeom prst="rect">
+            <a:avLst/>
+          </a:prstGeom>
+        </p:spPr>
+        <p:txBody>
+          <a:bodyPr wrap="square" lIns="91425" tIns="91425" rIns="91425" bIns="91425" anchor="ctr" anchorCtr="0">
+            <a:noAutofit/>
+          </a:bodyPr>
+          <a:lstStyle/>
+          <a:p>
+            <a:pPr lvl="0" rtl="0">
+              <a:spcBef>
+                <a:spcPts val="0"/>
+              </a:spcBef>
+              <a:buNone/>
+            </a:pPr>
+            <a:r>
+              <a:rPr lang="en-US" dirty="0" smtClean="0"/>
+              <a:t>Lab - 4</a:t>
+            </a:r>
+            <a:endParaRPr lang="en" dirty="0"/>
+          </a:p>
+        </p:txBody>
+      </p:sp>
+      <p:sp>
+        <p:nvSpPr>
+          <p:cNvPr id="192" name="Shape 192"/>
+          <p:cNvSpPr txBox="1">
+            <a:spLocks noGrp="1"/>
+          </p:cNvSpPr>
+          <p:nvPr>
+            <p:ph type="sldNum" idx="12"/>
+          </p:nvPr>
+        </p:nvSpPr>
+        <p:spPr>
+          <a:xfrm>
+            <a:off x="7618000" y="4636500"/>
+            <a:ext cx="1487400" cy="315600"/>
+          </a:xfrm>
+          <a:prstGeom prst="rect">
+            <a:avLst/>
+          </a:prstGeom>
+        </p:spPr>
+        <p:txBody>
+          <a:bodyPr wrap="square" lIns="91425" tIns="91425" rIns="91425" bIns="91425" anchor="ctr" anchorCtr="0">
+            <a:noAutofit/>
+          </a:bodyPr>
+          <a:lstStyle/>
+          <a:p>
+            <a:pPr lvl="0">
+              <a:spcBef>
+                <a:spcPts val="0"/>
+              </a:spcBef>
+              <a:buNone/>
+            </a:pPr>
+            <a:fld id="{00000000-1234-1234-1234-123412341234}" type="slidenum">
+              <a:rPr lang="en"/>
+              <a:t>17</a:t>
             </a:fld>
             <a:endParaRPr lang="en"/>
           </a:p>
@@ -6790,7 +7067,11 @@
             </a:pPr>
             <a:r>
               <a:rPr lang="en-US" dirty="0" smtClean="0"/>
-              <a:t>Reactive Programming Overview</a:t>
+              <a:t>Advanced </a:t>
+            </a:r>
+            <a:r>
+              <a:rPr lang="en-US" dirty="0" err="1" smtClean="0"/>
+              <a:t>RxSwift</a:t>
             </a:r>
             <a:endParaRPr lang="en" dirty="0"/>
           </a:p>
@@ -6877,8 +7158,8 @@
         </p:nvSpPr>
         <p:spPr>
           <a:xfrm>
-            <a:off x="554601" y="1650424"/>
-            <a:ext cx="8115791" cy="2471471"/>
+            <a:off x="151130" y="1650424"/>
+            <a:ext cx="8891026" cy="2862119"/>
           </a:xfrm>
           <a:prstGeom prst="rect">
             <a:avLst/>
@@ -6891,58 +7172,197 @@
           <a:lstStyle/>
           <a:p>
             <a:r>
-              <a:rPr lang="en-US" b="1" dirty="0" smtClean="0"/>
-              <a:t>Reactive </a:t>
-            </a:r>
-            <a:r>
-              <a:rPr lang="en-US" b="1" dirty="0"/>
-              <a:t>Programming Overview (</a:t>
-            </a:r>
-            <a:r>
-              <a:rPr lang="en-US" b="1" dirty="0" err="1"/>
-              <a:t>Jafar</a:t>
-            </a:r>
-            <a:r>
-              <a:rPr lang="en-US" b="1" dirty="0"/>
+              <a:rPr lang="en-US" dirty="0" smtClean="0"/>
+              <a:t>Day </a:t>
+            </a:r>
+            <a:r>
+              <a:rPr lang="en-US" dirty="0" smtClean="0"/>
+              <a:t>1 </a:t>
+            </a:r>
+            <a:r>
+              <a:rPr lang="mr-IN" dirty="0" smtClean="0"/>
+              <a:t>–</a:t>
+            </a:r>
+            <a:r>
+              <a:rPr lang="en-US" dirty="0" smtClean="0"/>
+              <a:t> Protocol-Oriented Programming, Protocol Extension, </a:t>
+            </a:r>
+            <a:r>
+              <a:rPr lang="en-US" dirty="0" err="1" smtClean="0"/>
+              <a:t>Associatetype</a:t>
+            </a:r>
+            <a:endParaRPr lang="en-US" dirty="0" smtClean="0"/>
+          </a:p>
+          <a:p>
+            <a:r>
+              <a:rPr lang="en-US" dirty="0"/>
+              <a:t>Day </a:t>
+            </a:r>
+            <a:r>
+              <a:rPr lang="en-US" dirty="0" smtClean="0"/>
+              <a:t>2 </a:t>
+            </a:r>
+            <a:r>
+              <a:rPr lang="mr-IN" dirty="0"/>
+              <a:t>–</a:t>
+            </a:r>
+            <a:r>
+              <a:rPr lang="en-US" dirty="0"/>
               <a:t> </a:t>
             </a:r>
             <a:r>
-              <a:rPr lang="en-US" b="1" dirty="0" err="1"/>
-              <a:t>Hussain</a:t>
-            </a:r>
-            <a:r>
-              <a:rPr lang="en-US" b="1" dirty="0"/>
-              <a:t> from Netflix</a:t>
-            </a:r>
-            <a:r>
-              <a:rPr lang="en-US" b="1" dirty="0" smtClean="0"/>
+              <a:rPr lang="en-US" dirty="0" smtClean="0"/>
+              <a:t>Network Call, Generic </a:t>
+            </a:r>
+            <a:r>
+              <a:rPr lang="en-US" dirty="0" err="1" smtClean="0"/>
+              <a:t>Enum</a:t>
+            </a:r>
+            <a:endParaRPr lang="en-US" dirty="0"/>
+          </a:p>
+          <a:p>
+            <a:r>
+              <a:rPr lang="en-US" dirty="0"/>
+              <a:t>Day </a:t>
+            </a:r>
+            <a:r>
+              <a:rPr lang="en-US" dirty="0" smtClean="0"/>
+              <a:t>3 </a:t>
+            </a:r>
+            <a:r>
+              <a:rPr lang="mr-IN" dirty="0"/>
+              <a:t>–</a:t>
+            </a:r>
+            <a:r>
+              <a:rPr lang="en-US" dirty="0"/>
+              <a:t> </a:t>
+            </a:r>
+            <a:r>
+              <a:rPr lang="en-US" dirty="0" smtClean="0"/>
+              <a:t>Binding Track Activity (show / hide ‘Loading’ )</a:t>
+            </a:r>
+            <a:endParaRPr lang="en-US" dirty="0"/>
+          </a:p>
+          <a:p>
+            <a:r>
+              <a:rPr lang="en-US" dirty="0"/>
+              <a:t>Day </a:t>
+            </a:r>
+            <a:r>
+              <a:rPr lang="en-US" dirty="0" smtClean="0"/>
+              <a:t>4 </a:t>
+            </a:r>
+            <a:r>
+              <a:rPr lang="mr-IN" dirty="0"/>
+              <a:t>–</a:t>
+            </a:r>
+            <a:r>
+              <a:rPr lang="en-US" dirty="0"/>
+              <a:t> </a:t>
+            </a:r>
+            <a:r>
+              <a:rPr lang="en-US" dirty="0" smtClean="0"/>
+              <a:t>Advanced </a:t>
+            </a:r>
+            <a:r>
+              <a:rPr lang="en-US" dirty="0" err="1" smtClean="0"/>
+              <a:t>Tab</a:t>
+            </a:r>
+            <a:r>
+              <a:rPr lang="en-US" dirty="0" err="1" smtClean="0"/>
+              <a:t>leView</a:t>
+            </a:r>
+            <a:r>
+              <a:rPr lang="en-US" dirty="0" smtClean="0"/>
+              <a:t> - </a:t>
+            </a:r>
+            <a:r>
+              <a:rPr lang="en-US" dirty="0" err="1" smtClean="0"/>
+              <a:t>RxDataSources</a:t>
+            </a:r>
+            <a:endParaRPr lang="en-US" dirty="0"/>
+          </a:p>
+          <a:p>
+            <a:r>
+              <a:rPr lang="en-US" dirty="0"/>
+              <a:t>Day </a:t>
+            </a:r>
+            <a:r>
+              <a:rPr lang="en-US" dirty="0" smtClean="0"/>
+              <a:t>5 </a:t>
+            </a:r>
+            <a:r>
+              <a:rPr lang="mr-IN" dirty="0"/>
+              <a:t>–</a:t>
+            </a:r>
+            <a:r>
+              <a:rPr lang="en-US" dirty="0"/>
+              <a:t> </a:t>
+            </a:r>
+            <a:r>
+              <a:rPr lang="en-US" dirty="0" smtClean="0"/>
+              <a:t>Schedu</a:t>
+            </a:r>
+            <a:r>
+              <a:rPr lang="en-US" dirty="0" smtClean="0"/>
+              <a:t>lers (</a:t>
+            </a:r>
+            <a:r>
+              <a:rPr lang="en-US" dirty="0" err="1" smtClean="0"/>
+              <a:t>observeOn</a:t>
+            </a:r>
+            <a:r>
+              <a:rPr lang="en-US" dirty="0" smtClean="0"/>
+              <a:t>, </a:t>
+            </a:r>
+            <a:r>
+              <a:rPr lang="en-US" dirty="0" err="1" smtClean="0"/>
+              <a:t>subscribeOn</a:t>
+            </a:r>
+            <a:r>
+              <a:rPr lang="en-US" dirty="0" smtClean="0"/>
+              <a:t>), </a:t>
+            </a:r>
+          </a:p>
+          <a:p>
+            <a:pPr lvl="1">
+              <a:buNone/>
+            </a:pPr>
+            <a:r>
+              <a:rPr lang="en-US" dirty="0"/>
+              <a:t>	</a:t>
+            </a:r>
+            <a:r>
+              <a:rPr lang="en-US" dirty="0" smtClean="0"/>
+              <a:t>	Unit Test (</a:t>
+            </a:r>
+            <a:r>
+              <a:rPr lang="en-US" dirty="0" err="1" smtClean="0"/>
+              <a:t>RxTest</a:t>
+            </a:r>
+            <a:r>
+              <a:rPr lang="en-US" dirty="0" smtClean="0"/>
+              <a:t>, </a:t>
+            </a:r>
+            <a:r>
+              <a:rPr lang="en-US" dirty="0" err="1" smtClean="0"/>
+              <a:t>RxBlocking</a:t>
+            </a:r>
+            <a:r>
+              <a:rPr lang="en-US" dirty="0" smtClean="0"/>
               <a:t>)</a:t>
             </a:r>
-          </a:p>
-          <a:p>
-            <a:endParaRPr lang="en-US" b="1" dirty="0"/>
-          </a:p>
-          <a:p>
-            <a:r>
-              <a:rPr lang="en-US" b="1" dirty="0">
-                <a:hlinkClick r:id="rId4"/>
-              </a:rPr>
-              <a:t>https://www.youtube.com/watch?v=</a:t>
-            </a:r>
-            <a:r>
-              <a:rPr lang="en-US" b="1" dirty="0" smtClean="0">
-                <a:hlinkClick r:id="rId4"/>
-              </a:rPr>
-              <a:t>dwP1TNXE6fc</a:t>
-            </a:r>
-            <a:endParaRPr lang="en-US" b="1" dirty="0" smtClean="0"/>
+            <a:endParaRPr lang="en-US" dirty="0"/>
+          </a:p>
+          <a:p>
+            <a:endParaRPr lang="en-US" dirty="0" smtClean="0"/>
           </a:p>
         </p:txBody>
       </p:sp>
     </p:spTree>
     <p:extLst>
       <p:ext uri="{BB962C8B-B14F-4D97-AF65-F5344CB8AC3E}">
-        <p14:creationId xmlns:p14="http://schemas.microsoft.com/office/powerpoint/2010/main" val="2284873979"/>
+        <p14:creationId xmlns:p14="http://schemas.microsoft.com/office/powerpoint/2010/main" val="293183271"/>
       </p:ext>
     </p:extLst>
   </p:cSld>
@@ -7009,7 +7429,7 @@
             </a:pPr>
             <a:r>
               <a:rPr lang="en-US" dirty="0" smtClean="0"/>
-              <a:t>Reactive Extensions</a:t>
+              <a:t>Reactive Programming Overview</a:t>
             </a:r>
             <a:endParaRPr lang="en" dirty="0"/>
           </a:p>
@@ -7111,15 +7531,57 @@
           <a:p>
             <a:r>
               <a:rPr lang="en-US" b="1" dirty="0" smtClean="0"/>
-              <a:t>What are Reactive Extensions (Video)</a:t>
-            </a:r>
+              <a:t>Reactive </a:t>
+            </a:r>
+            <a:r>
+              <a:rPr lang="en-US" b="1" dirty="0"/>
+              <a:t>Programming Overview (</a:t>
+            </a:r>
+            <a:r>
+              <a:rPr lang="en-US" b="1" dirty="0" err="1"/>
+              <a:t>Jafar</a:t>
+            </a:r>
+            <a:r>
+              <a:rPr lang="en-US" b="1" dirty="0"/>
+              <a:t> </a:t>
+            </a:r>
+            <a:r>
+              <a:rPr lang="en-US" b="1" dirty="0" err="1"/>
+              <a:t>Hussain</a:t>
+            </a:r>
+            <a:r>
+              <a:rPr lang="en-US" b="1" dirty="0"/>
+              <a:t> from Netflix</a:t>
+            </a:r>
+            <a:r>
+              <a:rPr lang="en-US" b="1" dirty="0" smtClean="0"/>
+              <a:t>)</a:t>
+            </a:r>
+          </a:p>
+          <a:p>
+            <a:endParaRPr lang="en-US" b="1" dirty="0"/>
+          </a:p>
+          <a:p>
+            <a:r>
+              <a:rPr lang="en-US" b="1" dirty="0">
+                <a:hlinkClick r:id="rId4"/>
+              </a:rPr>
+              <a:t>https://www.youtube.com/watch?v=</a:t>
+            </a:r>
+            <a:r>
+              <a:rPr lang="en-US" b="1" dirty="0" smtClean="0">
+                <a:hlinkClick r:id="rId4"/>
+              </a:rPr>
+              <a:t>dwP1TNXE6fc</a:t>
+            </a:r>
+            <a:endParaRPr lang="en-US" b="1" dirty="0" smtClean="0"/>
           </a:p>
         </p:txBody>
       </p:sp>
     </p:spTree>
     <p:extLst>
       <p:ext uri="{BB962C8B-B14F-4D97-AF65-F5344CB8AC3E}">
-        <p14:creationId xmlns:p14="http://schemas.microsoft.com/office/powerpoint/2010/main" val="1550621407"/>
+        <p14:creationId xmlns:p14="http://schemas.microsoft.com/office/powerpoint/2010/main" val="2284873979"/>
       </p:ext>
     </p:extLst>
   </p:cSld>
@@ -7186,7 +7648,7 @@
             </a:pPr>
             <a:r>
               <a:rPr lang="en-US" dirty="0" smtClean="0"/>
-              <a:t>Marble Diagrams</a:t>
+              <a:t>Reactive Extensions</a:t>
             </a:r>
             <a:endParaRPr lang="en" dirty="0"/>
           </a:p>
@@ -7288,7 +7750,7 @@
           <a:p>
             <a:r>
               <a:rPr lang="en-US" b="1" dirty="0" smtClean="0"/>
-              <a:t>Use Marble Diagrams(Video)</a:t>
+              <a:t>What are Reactive Extensions (Video)</a:t>
             </a:r>
           </a:p>
         </p:txBody>
@@ -7296,7 +7758,7 @@
     </p:spTree>
     <p:extLst>
       <p:ext uri="{BB962C8B-B14F-4D97-AF65-F5344CB8AC3E}">
-        <p14:creationId xmlns:p14="http://schemas.microsoft.com/office/powerpoint/2010/main" val="4224057141"/>
+        <p14:creationId xmlns:p14="http://schemas.microsoft.com/office/powerpoint/2010/main" val="1550621407"/>
       </p:ext>
     </p:extLst>
   </p:cSld>
@@ -7363,7 +7825,7 @@
             </a:pPr>
             <a:r>
               <a:rPr lang="en-US" dirty="0" smtClean="0"/>
-              <a:t>Observable Sequence</a:t>
+              <a:t>Marble Diagrams</a:t>
             </a:r>
             <a:endParaRPr lang="en" dirty="0"/>
           </a:p>
@@ -7440,7 +7902,7 @@
       </p:pic>
       <p:sp>
         <p:nvSpPr>
-          <p:cNvPr id="7" name="Shape 237"/>
+          <p:cNvPr id="9" name="Shape 237"/>
           <p:cNvSpPr txBox="1">
             <a:spLocks noGrp="1"/>
           </p:cNvSpPr>
@@ -7450,8 +7912,8 @@
         </p:nvSpPr>
         <p:spPr>
           <a:xfrm>
-            <a:off x="814274" y="1475320"/>
-            <a:ext cx="6941095" cy="2526036"/>
+            <a:off x="554601" y="1650424"/>
+            <a:ext cx="8115791" cy="2471471"/>
           </a:xfrm>
           <a:prstGeom prst="rect">
             <a:avLst/>
@@ -7463,48 +7925,17 @@
           </a:bodyPr>
           <a:lstStyle/>
           <a:p>
-            <a:pPr>
-              <a:buNone/>
-            </a:pPr>
-            <a:r>
-              <a:rPr lang="en-US" b="1" dirty="0"/>
-              <a:t>Observable </a:t>
-            </a:r>
-            <a:endParaRPr lang="en-US" dirty="0"/>
-          </a:p>
-          <a:p>
-            <a:r>
-              <a:rPr lang="en-US" dirty="0" smtClean="0"/>
-              <a:t> Emits </a:t>
-            </a:r>
-            <a:r>
-              <a:rPr lang="en-US" dirty="0"/>
-              <a:t>events over time </a:t>
-            </a:r>
-          </a:p>
-          <a:p>
-            <a:pPr>
-              <a:buNone/>
-            </a:pPr>
-            <a:r>
-              <a:rPr lang="en-US" b="1" dirty="0"/>
-              <a:t>Observer </a:t>
-            </a:r>
-            <a:endParaRPr lang="en-US" dirty="0"/>
-          </a:p>
-          <a:p>
-            <a:r>
-              <a:rPr lang="en-US" dirty="0" smtClean="0"/>
-              <a:t> Subscribe to listen events emitted by the observable </a:t>
-            </a:r>
-            <a:endParaRPr lang="en-US" dirty="0"/>
+            <a:r>
+              <a:rPr lang="en-US" b="1" dirty="0" smtClean="0"/>
+              <a:t>Use Marble Diagrams(Video)</a:t>
+            </a:r>
           </a:p>
         </p:txBody>
       </p:sp>
     </p:spTree>
     <p:extLst>
       <p:ext uri="{BB962C8B-B14F-4D97-AF65-F5344CB8AC3E}">
-        <p14:creationId xmlns:p14="http://schemas.microsoft.com/office/powerpoint/2010/main" val="10934207"/>
+        <p14:creationId xmlns:p14="http://schemas.microsoft.com/office/powerpoint/2010/main" val="4224057141"/>
       </p:ext>
     </p:extLst>
   </p:cSld>
@@ -7571,7 +8002,7 @@
             </a:pPr>
             <a:r>
               <a:rPr lang="en-US" dirty="0" smtClean="0"/>
-              <a:t>Observable Sample - 1</a:t>
+              <a:t>Observable Sequence</a:t>
             </a:r>
             <a:endParaRPr lang="en" dirty="0"/>
           </a:p>
@@ -7646,40 +8077,73 @@
           </a:prstGeom>
         </p:spPr>
       </p:pic>
-      <p:pic>
-        <p:nvPicPr>
-          <p:cNvPr id="4" name="Picture 3" descr="Screen Shot 2018-04-15 at 11.28.39 PM.png"/>
-          <p:cNvPicPr>
-            <a:picLocks noChangeAspect="1"/>
-          </p:cNvPicPr>
-          <p:nvPr/>
-        </p:nvPicPr>
-        <p:blipFill>
-          <a:blip r:embed="rId4">
-            <a:extLst>
-              <a:ext uri="{28A0092B-C50C-407E-A947-70E740481C1C}">
-                <a14:useLocalDpi xmlns:a14="http://schemas.microsoft.com/office/drawing/2010/main" val="0"/>
-              </a:ext>
-            </a:extLst>
-          </a:blip>
-          <a:stretch>
-            <a:fillRect/>
-          </a:stretch>
-        </p:blipFill>
-        <p:spPr>
-          <a:xfrm>
-            <a:off x="965819" y="1683036"/>
-            <a:ext cx="3512513" cy="2953464"/>
-          </a:xfrm>
-          <a:prstGeom prst="rect">
-            <a:avLst/>
-          </a:prstGeom>
-        </p:spPr>
-      </p:pic>
+      <p:sp>
+        <p:nvSpPr>
+          <p:cNvPr id="7" name="Shape 237"/>
+          <p:cNvSpPr txBox="1">
+            <a:spLocks noGrp="1"/>
+          </p:cNvSpPr>
+          <p:nvPr>
+            <p:ph type="body" idx="1"/>
+          </p:nvPr>
+        </p:nvSpPr>
+        <p:spPr>
+          <a:xfrm>
+            <a:off x="814274" y="1475320"/>
+            <a:ext cx="6941095" cy="2526036"/>
+          </a:xfrm>
+          <a:prstGeom prst="rect">
+            <a:avLst/>
+          </a:prstGeom>
+        </p:spPr>
+        <p:txBody>
+          <a:bodyPr wrap="square" lIns="91425" tIns="91425" rIns="91425" bIns="91425" anchor="ctr" anchorCtr="0">
+            <a:noAutofit/>
+          </a:bodyPr>
+          <a:lstStyle/>
+          <a:p>
+            <a:pPr>
+              <a:buNone/>
+            </a:pPr>
+            <a:r>
+              <a:rPr lang="en-US" b="1" dirty="0"/>
+              <a:t>Observable </a:t>
+            </a:r>
+            <a:endParaRPr lang="en-US" dirty="0"/>
+          </a:p>
+          <a:p>
+            <a:r>
+              <a:rPr lang="en-US" dirty="0" smtClean="0"/>
+              <a:t> Emits </a:t>
+            </a:r>
+            <a:r>
+              <a:rPr lang="en-US" dirty="0"/>
+              <a:t>events over time </a:t>
+            </a:r>
+          </a:p>
+          <a:p>
+            <a:pPr>
+              <a:buNone/>
+            </a:pPr>
+            <a:r>
+              <a:rPr lang="en-US" b="1" dirty="0"/>
+              <a:t>Observer </a:t>
+            </a:r>
+            <a:endParaRPr lang="en-US" dirty="0"/>
+          </a:p>
+          <a:p>
+            <a:r>
+              <a:rPr lang="en-US" dirty="0" smtClean="0"/>
+              <a:t> Subscribe to listen events emitted by the observable </a:t>
+            </a:r>
+            <a:endParaRPr lang="en-US" dirty="0"/>
+          </a:p>
+        </p:txBody>
+      </p:sp>
     </p:spTree>
     <p:extLst>
       <p:ext uri="{BB962C8B-B14F-4D97-AF65-F5344CB8AC3E}">
-        <p14:creationId xmlns:p14="http://schemas.microsoft.com/office/powerpoint/2010/main" val="3948069654"/>
+        <p14:creationId xmlns:p14="http://schemas.microsoft.com/office/powerpoint/2010/main" val="10934207"/>
       </p:ext>
     </p:extLst>
   </p:cSld>
@@ -7746,7 +8210,7 @@
             </a:pPr>
             <a:r>
               <a:rPr lang="en-US" dirty="0" smtClean="0"/>
-              <a:t>Observable Sample - 2</a:t>
+              <a:t>Observable Sample - 1</a:t>
             </a:r>
             <a:endParaRPr lang="en" dirty="0"/>
           </a:p>
@@ -7823,7 +8287,7 @@
       </p:pic>
       <p:pic>
         <p:nvPicPr>
-          <p:cNvPr id="3" name="Picture 2" descr="Screen Shot 2018-04-17 at 8.44.21 PM.png"/>
+          <p:cNvPr id="4" name="Picture 3" descr="Screen Shot 2018-04-15 at 11.28.39 PM.png"/>
           <p:cNvPicPr>
             <a:picLocks noChangeAspect="1"/>
           </p:cNvPicPr>
@@ -7843,8 +8307,8 @@
         </p:blipFill>
         <p:spPr>
           <a:xfrm>
-            <a:off x="579223" y="1909977"/>
-            <a:ext cx="6189534" cy="1879785"/>
+            <a:off x="965819" y="1683036"/>
+            <a:ext cx="3512513" cy="2953464"/>
           </a:xfrm>
           <a:prstGeom prst="rect">
             <a:avLst/>
@@ -7854,7 +8318,7 @@
     </p:spTree>
     <p:extLst>
       <p:ext uri="{BB962C8B-B14F-4D97-AF65-F5344CB8AC3E}">
-        <p14:creationId xmlns:p14="http://schemas.microsoft.com/office/powerpoint/2010/main" val="2123354099"/>
+        <p14:creationId xmlns:p14="http://schemas.microsoft.com/office/powerpoint/2010/main" val="3948069654"/>
       </p:ext>
     </p:extLst>
   </p:cSld>
@@ -7921,7 +8385,7 @@
             </a:pPr>
             <a:r>
               <a:rPr lang="en-US" dirty="0" smtClean="0"/>
-              <a:t>Observable Sample - 3</a:t>
+              <a:t>Observable Sample - 2</a:t>
             </a:r>
             <a:endParaRPr lang="en" dirty="0"/>
           </a:p>
@@ -7998,7 +8462,7 @@
       </p:pic>
       <p:pic>
         <p:nvPicPr>
-          <p:cNvPr id="4" name="Picture 3" descr="Screen Shot 2018-04-16 at 7.46.51 PM.png"/>
+          <p:cNvPr id="3" name="Picture 2" descr="Screen Shot 2018-04-17 at 8.44.21 PM.png"/>
           <p:cNvPicPr>
             <a:picLocks noChangeAspect="1"/>
           </p:cNvPicPr>
@@ -8018,8 +8482,8 @@
         </p:blipFill>
         <p:spPr>
           <a:xfrm>
-            <a:off x="1190883" y="1585612"/>
-            <a:ext cx="4483100" cy="3213100"/>
+            <a:off x="579223" y="1909977"/>
+            <a:ext cx="6189534" cy="1879785"/>
           </a:xfrm>
           <a:prstGeom prst="rect">
             <a:avLst/>
@@ -8029,7 +8493,7 @@
     </p:spTree>
     <p:extLst>
       <p:ext uri="{BB962C8B-B14F-4D97-AF65-F5344CB8AC3E}">
-        <p14:creationId xmlns:p14="http://schemas.microsoft.com/office/powerpoint/2010/main" val="3848107491"/>
+        <p14:creationId xmlns:p14="http://schemas.microsoft.com/office/powerpoint/2010/main" val="2123354099"/>
       </p:ext>
     </p:extLst>
   </p:cSld>

</xml_diff>

<commit_message>
Advanced RxSwift - Day5 RxTest RxBlocking
</commit_message>
<xml_diff>
--- a/RxSwiftBasics/day1/RxSwiftBasics1.pptx
+++ b/RxSwiftBasics/day1/RxSwiftBasics1.pptx
@@ -7173,11 +7173,7 @@
           <a:p>
             <a:r>
               <a:rPr lang="en-US" dirty="0" smtClean="0"/>
-              <a:t>Day </a:t>
-            </a:r>
-            <a:r>
-              <a:rPr lang="en-US" dirty="0" smtClean="0"/>
-              <a:t>1 </a:t>
+              <a:t>Day 1 </a:t>
             </a:r>
             <a:r>
               <a:rPr lang="mr-IN" dirty="0" smtClean="0"/>
@@ -7266,11 +7262,7 @@
             </a:r>
             <a:r>
               <a:rPr lang="en-US" dirty="0" err="1" smtClean="0"/>
-              <a:t>Tab</a:t>
-            </a:r>
-            <a:r>
-              <a:rPr lang="en-US" dirty="0" err="1" smtClean="0"/>
-              <a:t>leView</a:t>
+              <a:t>TableView</a:t>
             </a:r>
             <a:r>
               <a:rPr lang="en-US" dirty="0" smtClean="0"/>
@@ -7301,11 +7293,7 @@
             </a:r>
             <a:r>
               <a:rPr lang="en-US" dirty="0" smtClean="0"/>
-              <a:t>Schedu</a:t>
-            </a:r>
-            <a:r>
-              <a:rPr lang="en-US" dirty="0" smtClean="0"/>
-              <a:t>lers (</a:t>
+              <a:t>Schedulers (</a:t>
             </a:r>
             <a:r>
               <a:rPr lang="en-US" dirty="0" err="1" smtClean="0"/>
@@ -8287,7 +8275,7 @@
       </p:pic>
       <p:pic>
         <p:nvPicPr>
-          <p:cNvPr id="4" name="Picture 3" descr="Screen Shot 2018-04-15 at 11.28.39 PM.png"/>
+          <p:cNvPr id="5" name="Picture 4" descr="Screen Shot 2018-05-26 at 7.49.16 AM.png"/>
           <p:cNvPicPr>
             <a:picLocks noChangeAspect="1"/>
           </p:cNvPicPr>
@@ -8307,8 +8295,8 @@
         </p:blipFill>
         <p:spPr>
           <a:xfrm>
-            <a:off x="965819" y="1683036"/>
-            <a:ext cx="3512513" cy="2953464"/>
+            <a:off x="205275" y="1365467"/>
+            <a:ext cx="5867400" cy="3733800"/>
           </a:xfrm>
           <a:prstGeom prst="rect">
             <a:avLst/>

</xml_diff>